<commit_message>
added final files for project
</commit_message>
<xml_diff>
--- a/Final Project/Rock Paper Scissors Problem.pptx
+++ b/Final Project/Rock Paper Scissors Problem.pptx
@@ -5,7 +5,7 @@
     <p:sldMasterId id="2147483648" r:id="rId1"/>
   </p:sldMasterIdLst>
   <p:notesMasterIdLst>
-    <p:notesMasterId r:id="rId21"/>
+    <p:notesMasterId r:id="rId22"/>
   </p:notesMasterIdLst>
   <p:sldIdLst>
     <p:sldId id="256" r:id="rId2"/>
@@ -21,12 +21,13 @@
     <p:sldId id="274" r:id="rId12"/>
     <p:sldId id="275" r:id="rId13"/>
     <p:sldId id="276" r:id="rId14"/>
-    <p:sldId id="263" r:id="rId15"/>
-    <p:sldId id="264" r:id="rId16"/>
-    <p:sldId id="265" r:id="rId17"/>
-    <p:sldId id="266" r:id="rId18"/>
-    <p:sldId id="277" r:id="rId19"/>
-    <p:sldId id="278" r:id="rId20"/>
+    <p:sldId id="279" r:id="rId15"/>
+    <p:sldId id="263" r:id="rId16"/>
+    <p:sldId id="264" r:id="rId17"/>
+    <p:sldId id="265" r:id="rId18"/>
+    <p:sldId id="266" r:id="rId19"/>
+    <p:sldId id="277" r:id="rId20"/>
+    <p:sldId id="278" r:id="rId21"/>
   </p:sldIdLst>
   <p:sldSz cx="12192000" cy="6858000"/>
   <p:notesSz cx="6858000" cy="9144000"/>
@@ -331,7 +332,7 @@
           <a:p>
             <a:fld id="{DBACF75E-E9E0-46CD-9F03-1FE843A7A4FB}" type="datetimeFigureOut">
               <a:rPr lang="en-US" smtClean="0"/>
-              <a:t>12/29/2021</a:t>
+              <a:t>1/1/2022</a:t>
             </a:fld>
             <a:endParaRPr lang="en-US"/>
           </a:p>
@@ -708,6 +709,90 @@
 </p:notes>
 </file>
 
+<file path=ppt/notesSlides/notesSlide10.xml><?xml version="1.0" encoding="utf-8"?>
+<p:notes xmlns:a="http://schemas.openxmlformats.org/drawingml/2006/main" xmlns:r="http://schemas.openxmlformats.org/officeDocument/2006/relationships" xmlns:p="http://schemas.openxmlformats.org/presentationml/2006/main">
+  <p:cSld>
+    <p:spTree>
+      <p:nvGrpSpPr>
+        <p:cNvPr id="1" name=""/>
+        <p:cNvGrpSpPr/>
+        <p:nvPr/>
+      </p:nvGrpSpPr>
+      <p:grpSpPr>
+        <a:xfrm>
+          <a:off x="0" y="0"/>
+          <a:ext cx="0" cy="0"/>
+          <a:chOff x="0" y="0"/>
+          <a:chExt cx="0" cy="0"/>
+        </a:xfrm>
+      </p:grpSpPr>
+      <p:sp>
+        <p:nvSpPr>
+          <p:cNvPr id="2" name="מציין מיקום של תמונת שקופית 1"/>
+          <p:cNvSpPr>
+            <a:spLocks noGrp="1" noRot="1" noChangeAspect="1"/>
+          </p:cNvSpPr>
+          <p:nvPr>
+            <p:ph type="sldImg"/>
+          </p:nvPr>
+        </p:nvSpPr>
+        <p:spPr/>
+      </p:sp>
+      <p:sp>
+        <p:nvSpPr>
+          <p:cNvPr id="3" name="מציין מיקום של הערות 2"/>
+          <p:cNvSpPr>
+            <a:spLocks noGrp="1"/>
+          </p:cNvSpPr>
+          <p:nvPr>
+            <p:ph type="body" idx="1"/>
+          </p:nvPr>
+        </p:nvSpPr>
+        <p:spPr/>
+        <p:txBody>
+          <a:bodyPr/>
+          <a:lstStyle/>
+          <a:p>
+            <a:endParaRPr lang="en-US"/>
+          </a:p>
+        </p:txBody>
+      </p:sp>
+      <p:sp>
+        <p:nvSpPr>
+          <p:cNvPr id="4" name="מציין מיקום של מספר שקופית 3"/>
+          <p:cNvSpPr>
+            <a:spLocks noGrp="1"/>
+          </p:cNvSpPr>
+          <p:nvPr>
+            <p:ph type="sldNum" sz="quarter" idx="5"/>
+          </p:nvPr>
+        </p:nvSpPr>
+        <p:spPr/>
+        <p:txBody>
+          <a:bodyPr/>
+          <a:lstStyle/>
+          <a:p>
+            <a:fld id="{FB1E8730-ACE8-464E-9566-9727F7F78D3C}" type="slidenum">
+              <a:rPr lang="en-US" smtClean="0"/>
+              <a:t>14</a:t>
+            </a:fld>
+            <a:endParaRPr lang="en-US"/>
+          </a:p>
+        </p:txBody>
+      </p:sp>
+    </p:spTree>
+    <p:extLst>
+      <p:ext uri="{BB962C8B-B14F-4D97-AF65-F5344CB8AC3E}">
+        <p14:creationId xmlns:p14="http://schemas.microsoft.com/office/powerpoint/2010/main" val="984755541"/>
+      </p:ext>
+    </p:extLst>
+  </p:cSld>
+  <p:clrMapOvr>
+    <a:masterClrMapping/>
+  </p:clrMapOvr>
+</p:notes>
+</file>
+
 <file path=ppt/notesSlides/notesSlide2.xml><?xml version="1.0" encoding="utf-8"?>
 <p:notes xmlns:a="http://schemas.openxmlformats.org/drawingml/2006/main" xmlns:r="http://schemas.openxmlformats.org/officeDocument/2006/relationships" xmlns:p="http://schemas.openxmlformats.org/presentationml/2006/main">
   <p:cSld>
@@ -1788,7 +1873,7 @@
             <a:fld id="{B61BEF0D-F0BB-DE4B-95CE-6DB70DBA9567}" type="datetimeFigureOut">
               <a:rPr lang="en-US" dirty="0"/>
               <a:pPr/>
-              <a:t>12/29/2021</a:t>
+              <a:t>1/1/2022</a:t>
             </a:fld>
             <a:endParaRPr lang="en-US" dirty="0"/>
           </a:p>
@@ -2047,7 +2132,7 @@
             <a:fld id="{B61BEF0D-F0BB-DE4B-95CE-6DB70DBA9567}" type="datetimeFigureOut">
               <a:rPr lang="en-US" dirty="0"/>
               <a:pPr/>
-              <a:t>12/29/2021</a:t>
+              <a:t>1/1/2022</a:t>
             </a:fld>
             <a:endParaRPr lang="en-US" dirty="0"/>
           </a:p>
@@ -2279,7 +2364,7 @@
             <a:fld id="{B61BEF0D-F0BB-DE4B-95CE-6DB70DBA9567}" type="datetimeFigureOut">
               <a:rPr lang="en-US" dirty="0"/>
               <a:pPr/>
-              <a:t>12/29/2021</a:t>
+              <a:t>1/1/2022</a:t>
             </a:fld>
             <a:endParaRPr lang="en-US" dirty="0"/>
           </a:p>
@@ -2516,7 +2601,7 @@
             <a:fld id="{B61BEF0D-F0BB-DE4B-95CE-6DB70DBA9567}" type="datetimeFigureOut">
               <a:rPr lang="en-US" dirty="0"/>
               <a:pPr/>
-              <a:t>12/29/2021</a:t>
+              <a:t>1/1/2022</a:t>
             </a:fld>
             <a:endParaRPr lang="en-US" dirty="0"/>
           </a:p>
@@ -2820,7 +2905,7 @@
             <a:fld id="{B61BEF0D-F0BB-DE4B-95CE-6DB70DBA9567}" type="datetimeFigureOut">
               <a:rPr lang="en-US" dirty="0"/>
               <a:pPr/>
-              <a:t>12/29/2021</a:t>
+              <a:t>1/1/2022</a:t>
             </a:fld>
             <a:endParaRPr lang="en-US" dirty="0"/>
           </a:p>
@@ -3119,7 +3204,7 @@
             <a:fld id="{B61BEF0D-F0BB-DE4B-95CE-6DB70DBA9567}" type="datetimeFigureOut">
               <a:rPr lang="en-US" dirty="0"/>
               <a:pPr/>
-              <a:t>12/29/2021</a:t>
+              <a:t>1/1/2022</a:t>
             </a:fld>
             <a:endParaRPr lang="en-US" dirty="0"/>
           </a:p>
@@ -3538,7 +3623,7 @@
             <a:fld id="{B61BEF0D-F0BB-DE4B-95CE-6DB70DBA9567}" type="datetimeFigureOut">
               <a:rPr lang="en-US" dirty="0"/>
               <a:pPr/>
-              <a:t>12/29/2021</a:t>
+              <a:t>1/1/2022</a:t>
             </a:fld>
             <a:endParaRPr lang="en-US" dirty="0"/>
           </a:p>
@@ -3697,7 +3782,7 @@
             <a:fld id="{B61BEF0D-F0BB-DE4B-95CE-6DB70DBA9567}" type="datetimeFigureOut">
               <a:rPr lang="en-US" dirty="0"/>
               <a:pPr/>
-              <a:t>12/29/2021</a:t>
+              <a:t>1/1/2022</a:t>
             </a:fld>
             <a:endParaRPr lang="en-US" dirty="0"/>
           </a:p>
@@ -3789,7 +3874,7 @@
             <a:fld id="{B61BEF0D-F0BB-DE4B-95CE-6DB70DBA9567}" type="datetimeFigureOut">
               <a:rPr lang="en-US" dirty="0"/>
               <a:pPr/>
-              <a:t>12/29/2021</a:t>
+              <a:t>1/1/2022</a:t>
             </a:fld>
             <a:endParaRPr lang="en-US" dirty="0"/>
           </a:p>
@@ -4164,7 +4249,7 @@
             <a:fld id="{B61BEF0D-F0BB-DE4B-95CE-6DB70DBA9567}" type="datetimeFigureOut">
               <a:rPr lang="en-US" dirty="0"/>
               <a:pPr/>
-              <a:t>12/29/2021</a:t>
+              <a:t>1/1/2022</a:t>
             </a:fld>
             <a:endParaRPr lang="en-US" dirty="0"/>
           </a:p>
@@ -4450,7 +4535,7 @@
             <a:fld id="{B61BEF0D-F0BB-DE4B-95CE-6DB70DBA9567}" type="datetimeFigureOut">
               <a:rPr lang="en-US" dirty="0"/>
               <a:pPr/>
-              <a:t>12/29/2021</a:t>
+              <a:t>1/1/2022</a:t>
             </a:fld>
             <a:endParaRPr lang="en-US" dirty="0"/>
           </a:p>
@@ -4658,7 +4743,7 @@
             <a:fld id="{B61BEF0D-F0BB-DE4B-95CE-6DB70DBA9567}" type="datetimeFigureOut">
               <a:rPr lang="en-US" dirty="0"/>
               <a:pPr/>
-              <a:t>12/29/2021</a:t>
+              <a:t>1/1/2022</a:t>
             </a:fld>
             <a:endParaRPr lang="en-US" dirty="0"/>
           </a:p>
@@ -6177,6 +6262,140 @@
       </p:grpSpPr>
       <p:sp>
         <p:nvSpPr>
+          <p:cNvPr id="2" name="כותרת 1">
+            <a:extLst>
+              <a:ext uri="{FF2B5EF4-FFF2-40B4-BE49-F238E27FC236}">
+                <a16:creationId xmlns:a16="http://schemas.microsoft.com/office/drawing/2014/main" id="{94362960-29E4-4DD6-8A53-8CFFDB527193}"/>
+              </a:ext>
+            </a:extLst>
+          </p:cNvPr>
+          <p:cNvSpPr>
+            <a:spLocks noGrp="1"/>
+          </p:cNvSpPr>
+          <p:nvPr>
+            <p:ph type="title"/>
+          </p:nvPr>
+        </p:nvSpPr>
+        <p:spPr/>
+        <p:txBody>
+          <a:bodyPr/>
+          <a:lstStyle/>
+          <a:p>
+            <a:r>
+              <a:rPr lang="en-US"/>
+              <a:t>Keras tuner – hyper parameter</a:t>
+            </a:r>
+          </a:p>
+        </p:txBody>
+      </p:sp>
+      <p:sp>
+        <p:nvSpPr>
+          <p:cNvPr id="3" name="מציין מיקום תוכן 2">
+            <a:extLst>
+              <a:ext uri="{FF2B5EF4-FFF2-40B4-BE49-F238E27FC236}">
+                <a16:creationId xmlns:a16="http://schemas.microsoft.com/office/drawing/2014/main" id="{76DA792C-A3D0-4376-8E7F-132561A15E59}"/>
+              </a:ext>
+            </a:extLst>
+          </p:cNvPr>
+          <p:cNvSpPr>
+            <a:spLocks noGrp="1"/>
+          </p:cNvSpPr>
+          <p:nvPr>
+            <p:ph idx="1"/>
+          </p:nvPr>
+        </p:nvSpPr>
+        <p:spPr>
+          <a:xfrm>
+            <a:off x="581193" y="869489"/>
+            <a:ext cx="11029615" cy="3678303"/>
+          </a:xfrm>
+        </p:spPr>
+        <p:txBody>
+          <a:bodyPr/>
+          <a:lstStyle/>
+          <a:p>
+            <a:pPr marL="0" indent="0">
+              <a:lnSpc>
+                <a:spcPct val="150000"/>
+              </a:lnSpc>
+              <a:buNone/>
+            </a:pPr>
+            <a:r>
+              <a:rPr lang="en-US" b="0" i="0">
+                <a:solidFill>
+                  <a:srgbClr val="212529"/>
+                </a:solidFill>
+                <a:effectLst/>
+                <a:latin typeface="Open Sans" panose="020B0606030504020204" pitchFamily="34" charset="0"/>
+              </a:rPr>
+              <a:t>KerasTuner is an easy-to-use, scalable hyperparameter optimization framework that solves the pain points of hyperparameter search. Easily configure your search space with a define-by-run syntax, then leverage one of the available search algorithms to find the best hyperparameter values for your models.</a:t>
+            </a:r>
+            <a:endParaRPr lang="en-US"/>
+          </a:p>
+        </p:txBody>
+      </p:sp>
+      <p:pic>
+        <p:nvPicPr>
+          <p:cNvPr id="5" name="תמונה 4">
+            <a:extLst>
+              <a:ext uri="{FF2B5EF4-FFF2-40B4-BE49-F238E27FC236}">
+                <a16:creationId xmlns:a16="http://schemas.microsoft.com/office/drawing/2014/main" id="{6E9F9BD2-E3EC-41D6-A0AE-2840F6EF6395}"/>
+              </a:ext>
+            </a:extLst>
+          </p:cNvPr>
+          <p:cNvPicPr>
+            <a:picLocks noChangeAspect="1"/>
+          </p:cNvPicPr>
+          <p:nvPr/>
+        </p:nvPicPr>
+        <p:blipFill>
+          <a:blip r:embed="rId3"/>
+          <a:stretch>
+            <a:fillRect/>
+          </a:stretch>
+        </p:blipFill>
+        <p:spPr>
+          <a:xfrm>
+            <a:off x="1856783" y="3620999"/>
+            <a:ext cx="8478433" cy="2810267"/>
+          </a:xfrm>
+          <a:prstGeom prst="rect">
+            <a:avLst/>
+          </a:prstGeom>
+        </p:spPr>
+      </p:pic>
+    </p:spTree>
+    <p:extLst>
+      <p:ext uri="{BB962C8B-B14F-4D97-AF65-F5344CB8AC3E}">
+        <p14:creationId xmlns:p14="http://schemas.microsoft.com/office/powerpoint/2010/main" val="2525718679"/>
+      </p:ext>
+    </p:extLst>
+  </p:cSld>
+  <p:clrMapOvr>
+    <a:masterClrMapping/>
+  </p:clrMapOvr>
+</p:sld>
+</file>
+
+<file path=ppt/slides/slide15.xml><?xml version="1.0" encoding="utf-8"?>
+<p:sld xmlns:a="http://schemas.openxmlformats.org/drawingml/2006/main" xmlns:r="http://schemas.openxmlformats.org/officeDocument/2006/relationships" xmlns:p="http://schemas.openxmlformats.org/presentationml/2006/main">
+  <p:cSld>
+    <p:spTree>
+      <p:nvGrpSpPr>
+        <p:cNvPr id="1" name=""/>
+        <p:cNvGrpSpPr/>
+        <p:nvPr/>
+      </p:nvGrpSpPr>
+      <p:grpSpPr>
+        <a:xfrm>
+          <a:off x="0" y="0"/>
+          <a:ext cx="0" cy="0"/>
+          <a:chOff x="0" y="0"/>
+          <a:chExt cx="0" cy="0"/>
+        </a:xfrm>
+      </p:grpSpPr>
+      <p:sp>
+        <p:nvSpPr>
           <p:cNvPr id="2" name="Title 1">
             <a:extLst>
               <a:ext uri="{FF2B5EF4-FFF2-40B4-BE49-F238E27FC236}">
@@ -6398,7 +6617,7 @@
 </p:sld>
 </file>
 
-<file path=ppt/slides/slide15.xml><?xml version="1.0" encoding="utf-8"?>
+<file path=ppt/slides/slide16.xml><?xml version="1.0" encoding="utf-8"?>
 <p:sld xmlns:a="http://schemas.openxmlformats.org/drawingml/2006/main" xmlns:r="http://schemas.openxmlformats.org/officeDocument/2006/relationships" xmlns:p="http://schemas.openxmlformats.org/presentationml/2006/main">
   <p:cSld>
     <p:spTree>
@@ -6801,7 +7020,7 @@
 </p:sld>
 </file>
 
-<file path=ppt/slides/slide16.xml><?xml version="1.0" encoding="utf-8"?>
+<file path=ppt/slides/slide17.xml><?xml version="1.0" encoding="utf-8"?>
 <p:sld xmlns:a="http://schemas.openxmlformats.org/drawingml/2006/main" xmlns:r="http://schemas.openxmlformats.org/officeDocument/2006/relationships" xmlns:p="http://schemas.openxmlformats.org/presentationml/2006/main">
   <p:cSld>
     <p:spTree>
@@ -7425,7 +7644,7 @@
 </p:sld>
 </file>
 
-<file path=ppt/slides/slide17.xml><?xml version="1.0" encoding="utf-8"?>
+<file path=ppt/slides/slide18.xml><?xml version="1.0" encoding="utf-8"?>
 <p:sld xmlns:a="http://schemas.openxmlformats.org/drawingml/2006/main" xmlns:r="http://schemas.openxmlformats.org/officeDocument/2006/relationships" xmlns:p="http://schemas.openxmlformats.org/presentationml/2006/main">
   <p:cSld>
     <p:spTree>
@@ -7867,89 +8086,6 @@
 </p:sld>
 </file>
 
-<file path=ppt/slides/slide18.xml><?xml version="1.0" encoding="utf-8"?>
-<p:sld xmlns:a="http://schemas.openxmlformats.org/drawingml/2006/main" xmlns:r="http://schemas.openxmlformats.org/officeDocument/2006/relationships" xmlns:p="http://schemas.openxmlformats.org/presentationml/2006/main">
-  <p:cSld>
-    <p:spTree>
-      <p:nvGrpSpPr>
-        <p:cNvPr id="1" name=""/>
-        <p:cNvGrpSpPr/>
-        <p:nvPr/>
-      </p:nvGrpSpPr>
-      <p:grpSpPr>
-        <a:xfrm>
-          <a:off x="0" y="0"/>
-          <a:ext cx="0" cy="0"/>
-          <a:chOff x="0" y="0"/>
-          <a:chExt cx="0" cy="0"/>
-        </a:xfrm>
-      </p:grpSpPr>
-      <p:sp>
-        <p:nvSpPr>
-          <p:cNvPr id="2" name="כותרת 1">
-            <a:extLst>
-              <a:ext uri="{FF2B5EF4-FFF2-40B4-BE49-F238E27FC236}">
-                <a16:creationId xmlns:a16="http://schemas.microsoft.com/office/drawing/2014/main" id="{0F5A101D-5E07-4419-A24E-1115ACB407CF}"/>
-              </a:ext>
-            </a:extLst>
-          </p:cNvPr>
-          <p:cNvSpPr>
-            <a:spLocks noGrp="1"/>
-          </p:cNvSpPr>
-          <p:nvPr>
-            <p:ph type="title"/>
-          </p:nvPr>
-        </p:nvSpPr>
-        <p:spPr/>
-        <p:txBody>
-          <a:bodyPr/>
-          <a:lstStyle/>
-          <a:p>
-            <a:r>
-              <a:rPr lang="en-US"/>
-              <a:t>RESULTS</a:t>
-            </a:r>
-          </a:p>
-        </p:txBody>
-      </p:sp>
-      <p:sp>
-        <p:nvSpPr>
-          <p:cNvPr id="3" name="מציין מיקום תוכן 2">
-            <a:extLst>
-              <a:ext uri="{FF2B5EF4-FFF2-40B4-BE49-F238E27FC236}">
-                <a16:creationId xmlns:a16="http://schemas.microsoft.com/office/drawing/2014/main" id="{1BCE176C-8CAD-448F-BF59-E1EB235C6083}"/>
-              </a:ext>
-            </a:extLst>
-          </p:cNvPr>
-          <p:cNvSpPr>
-            <a:spLocks noGrp="1"/>
-          </p:cNvSpPr>
-          <p:nvPr>
-            <p:ph idx="1"/>
-          </p:nvPr>
-        </p:nvSpPr>
-        <p:spPr/>
-        <p:txBody>
-          <a:bodyPr/>
-          <a:lstStyle/>
-          <a:p>
-            <a:endParaRPr lang="en-US"/>
-          </a:p>
-        </p:txBody>
-      </p:sp>
-    </p:spTree>
-    <p:extLst>
-      <p:ext uri="{BB962C8B-B14F-4D97-AF65-F5344CB8AC3E}">
-        <p14:creationId xmlns:p14="http://schemas.microsoft.com/office/powerpoint/2010/main" val="2267438700"/>
-      </p:ext>
-    </p:extLst>
-  </p:cSld>
-  <p:clrMapOvr>
-    <a:masterClrMapping/>
-  </p:clrMapOvr>
-</p:sld>
-</file>
-
 <file path=ppt/slides/slide19.xml><?xml version="1.0" encoding="utf-8"?>
 <p:sld xmlns:a="http://schemas.openxmlformats.org/drawingml/2006/main" xmlns:r="http://schemas.openxmlformats.org/officeDocument/2006/relationships" xmlns:p="http://schemas.openxmlformats.org/presentationml/2006/main">
   <p:cSld>
@@ -7972,7 +8108,7 @@
           <p:cNvPr id="2" name="כותרת 1">
             <a:extLst>
               <a:ext uri="{FF2B5EF4-FFF2-40B4-BE49-F238E27FC236}">
-                <a16:creationId xmlns:a16="http://schemas.microsoft.com/office/drawing/2014/main" id="{536398F8-96B7-4D67-B796-B1B230F415F4}"/>
+                <a16:creationId xmlns:a16="http://schemas.microsoft.com/office/drawing/2014/main" id="{0F5A101D-5E07-4419-A24E-1115ACB407CF}"/>
               </a:ext>
             </a:extLst>
           </p:cNvPr>
@@ -7990,40 +8126,623 @@
           <a:p>
             <a:r>
               <a:rPr lang="en-US"/>
-              <a:t>CONCLUSIONS</a:t>
-            </a:r>
-          </a:p>
-        </p:txBody>
-      </p:sp>
-      <p:sp>
-        <p:nvSpPr>
-          <p:cNvPr id="3" name="מציין מיקום תוכן 2">
+              <a:t>RESULTS</a:t>
+            </a:r>
+          </a:p>
+        </p:txBody>
+      </p:sp>
+      <p:graphicFrame>
+        <p:nvGraphicFramePr>
+          <p:cNvPr id="4" name="מציין מיקום תוכן 3">
             <a:extLst>
               <a:ext uri="{FF2B5EF4-FFF2-40B4-BE49-F238E27FC236}">
-                <a16:creationId xmlns:a16="http://schemas.microsoft.com/office/drawing/2014/main" id="{EE30DDD9-FD29-49AE-8A76-B70A1E59C009}"/>
+                <a16:creationId xmlns:a16="http://schemas.microsoft.com/office/drawing/2014/main" id="{F4C2E96C-74EB-4EF2-AB2F-121CAAA09F5B}"/>
               </a:ext>
             </a:extLst>
           </p:cNvPr>
-          <p:cNvSpPr>
-            <a:spLocks noGrp="1"/>
-          </p:cNvSpPr>
+          <p:cNvGraphicFramePr>
+            <a:graphicFrameLocks noGrp="1"/>
+          </p:cNvGraphicFramePr>
           <p:nvPr>
             <p:ph idx="1"/>
-          </p:nvPr>
-        </p:nvSpPr>
-        <p:spPr/>
-        <p:txBody>
-          <a:bodyPr/>
-          <a:lstStyle/>
-          <a:p>
-            <a:endParaRPr lang="en-US"/>
-          </a:p>
-        </p:txBody>
-      </p:sp>
+            <p:extLst>
+              <p:ext uri="{D42A27DB-BD31-4B8C-83A1-F6EECF244321}">
+                <p14:modId xmlns:p14="http://schemas.microsoft.com/office/powerpoint/2010/main" val="237652330"/>
+              </p:ext>
+            </p:extLst>
+          </p:nvPr>
+        </p:nvGraphicFramePr>
+        <p:xfrm>
+          <a:off x="738554" y="2344615"/>
+          <a:ext cx="10081844" cy="4206434"/>
+        </p:xfrm>
+        <a:graphic>
+          <a:graphicData uri="http://schemas.openxmlformats.org/drawingml/2006/table">
+            <a:tbl>
+              <a:tblPr firstRow="1" firstCol="1" bandRow="1">
+                <a:tableStyleId>{5C22544A-7EE6-4342-B048-85BDC9FD1C3A}</a:tableStyleId>
+              </a:tblPr>
+              <a:tblGrid>
+                <a:gridCol w="2015851">
+                  <a:extLst>
+                    <a:ext uri="{9D8B030D-6E8A-4147-A177-3AD203B41FA5}">
+                      <a16:colId xmlns:a16="http://schemas.microsoft.com/office/drawing/2014/main" val="4253738073"/>
+                    </a:ext>
+                  </a:extLst>
+                </a:gridCol>
+                <a:gridCol w="2015851">
+                  <a:extLst>
+                    <a:ext uri="{9D8B030D-6E8A-4147-A177-3AD203B41FA5}">
+                      <a16:colId xmlns:a16="http://schemas.microsoft.com/office/drawing/2014/main" val="731336424"/>
+                    </a:ext>
+                  </a:extLst>
+                </a:gridCol>
+                <a:gridCol w="2016714">
+                  <a:extLst>
+                    <a:ext uri="{9D8B030D-6E8A-4147-A177-3AD203B41FA5}">
+                      <a16:colId xmlns:a16="http://schemas.microsoft.com/office/drawing/2014/main" val="855329753"/>
+                    </a:ext>
+                  </a:extLst>
+                </a:gridCol>
+                <a:gridCol w="2016714">
+                  <a:extLst>
+                    <a:ext uri="{9D8B030D-6E8A-4147-A177-3AD203B41FA5}">
+                      <a16:colId xmlns:a16="http://schemas.microsoft.com/office/drawing/2014/main" val="1633550259"/>
+                    </a:ext>
+                  </a:extLst>
+                </a:gridCol>
+                <a:gridCol w="2016714">
+                  <a:extLst>
+                    <a:ext uri="{9D8B030D-6E8A-4147-A177-3AD203B41FA5}">
+                      <a16:colId xmlns:a16="http://schemas.microsoft.com/office/drawing/2014/main" val="2304351830"/>
+                    </a:ext>
+                  </a:extLst>
+                </a:gridCol>
+              </a:tblGrid>
+              <a:tr h="2128586">
+                <a:tc>
+                  <a:txBody>
+                    <a:bodyPr/>
+                    <a:lstStyle/>
+                    <a:p>
+                      <a:pPr marL="0" marR="114300" indent="0" algn="ctr" rtl="0">
+                        <a:lnSpc>
+                          <a:spcPct val="150000"/>
+                        </a:lnSpc>
+                        <a:spcBef>
+                          <a:spcPts val="0"/>
+                        </a:spcBef>
+                        <a:spcAft>
+                          <a:spcPts val="0"/>
+                        </a:spcAft>
+                      </a:pPr>
+                      <a:r>
+                        <a:rPr lang="en-US" sz="2400" b="1">
+                          <a:effectLst/>
+                        </a:rPr>
+                        <a:t> </a:t>
+                      </a:r>
+                      <a:endParaRPr lang="en-US" sz="2000" b="1">
+                        <a:effectLst/>
+                        <a:latin typeface="Calibri" panose="020F0502020204030204" pitchFamily="34" charset="0"/>
+                        <a:ea typeface="Calibri" panose="020F0502020204030204" pitchFamily="34" charset="0"/>
+                        <a:cs typeface="Arial" panose="020B0604020202020204" pitchFamily="34" charset="0"/>
+                      </a:endParaRPr>
+                    </a:p>
+                  </a:txBody>
+                  <a:tcPr marL="68580" marR="68580" marT="0" marB="0"/>
+                </a:tc>
+                <a:tc>
+                  <a:txBody>
+                    <a:bodyPr/>
+                    <a:lstStyle/>
+                    <a:p>
+                      <a:pPr marL="0" marR="118745" indent="0" algn="ctr" rtl="0">
+                        <a:lnSpc>
+                          <a:spcPct val="150000"/>
+                        </a:lnSpc>
+                        <a:spcBef>
+                          <a:spcPts val="0"/>
+                        </a:spcBef>
+                        <a:spcAft>
+                          <a:spcPts val="0"/>
+                        </a:spcAft>
+                      </a:pPr>
+                      <a:r>
+                        <a:rPr lang="en-US" sz="2400" b="1">
+                          <a:effectLst/>
+                        </a:rPr>
+                        <a:t>Logistic Regression (Soft-max)</a:t>
+                      </a:r>
+                      <a:endParaRPr lang="en-US" sz="2000" b="1">
+                        <a:effectLst/>
+                        <a:latin typeface="Calibri" panose="020F0502020204030204" pitchFamily="34" charset="0"/>
+                        <a:ea typeface="Calibri" panose="020F0502020204030204" pitchFamily="34" charset="0"/>
+                        <a:cs typeface="Arial" panose="020B0604020202020204" pitchFamily="34" charset="0"/>
+                      </a:endParaRPr>
+                    </a:p>
+                  </a:txBody>
+                  <a:tcPr marL="68580" marR="68580" marT="0" marB="0"/>
+                </a:tc>
+                <a:tc>
+                  <a:txBody>
+                    <a:bodyPr/>
+                    <a:lstStyle/>
+                    <a:p>
+                      <a:pPr marL="0" marR="118745" indent="0" algn="ctr" rtl="0">
+                        <a:lnSpc>
+                          <a:spcPct val="150000"/>
+                        </a:lnSpc>
+                        <a:spcBef>
+                          <a:spcPts val="0"/>
+                        </a:spcBef>
+                        <a:spcAft>
+                          <a:spcPts val="0"/>
+                        </a:spcAft>
+                      </a:pPr>
+                      <a:r>
+                        <a:rPr lang="en-US" sz="2400" b="1">
+                          <a:effectLst/>
+                        </a:rPr>
+                        <a:t>MLP</a:t>
+                      </a:r>
+                      <a:endParaRPr lang="en-US" sz="2000" b="1">
+                        <a:effectLst/>
+                        <a:latin typeface="Calibri" panose="020F0502020204030204" pitchFamily="34" charset="0"/>
+                        <a:ea typeface="Calibri" panose="020F0502020204030204" pitchFamily="34" charset="0"/>
+                        <a:cs typeface="Arial" panose="020B0604020202020204" pitchFamily="34" charset="0"/>
+                      </a:endParaRPr>
+                    </a:p>
+                  </a:txBody>
+                  <a:tcPr marL="68580" marR="68580" marT="0" marB="0"/>
+                </a:tc>
+                <a:tc>
+                  <a:txBody>
+                    <a:bodyPr/>
+                    <a:lstStyle/>
+                    <a:p>
+                      <a:pPr marL="0" marR="118745" indent="0" algn="ctr" rtl="0">
+                        <a:lnSpc>
+                          <a:spcPct val="150000"/>
+                        </a:lnSpc>
+                        <a:spcBef>
+                          <a:spcPts val="0"/>
+                        </a:spcBef>
+                        <a:spcAft>
+                          <a:spcPts val="0"/>
+                        </a:spcAft>
+                      </a:pPr>
+                      <a:r>
+                        <a:rPr lang="en-US" sz="2400" b="1">
+                          <a:effectLst/>
+                        </a:rPr>
+                        <a:t>CNN</a:t>
+                      </a:r>
+                      <a:endParaRPr lang="en-US" sz="2000" b="1">
+                        <a:effectLst/>
+                        <a:latin typeface="Calibri" panose="020F0502020204030204" pitchFamily="34" charset="0"/>
+                        <a:ea typeface="Calibri" panose="020F0502020204030204" pitchFamily="34" charset="0"/>
+                        <a:cs typeface="Arial" panose="020B0604020202020204" pitchFamily="34" charset="0"/>
+                      </a:endParaRPr>
+                    </a:p>
+                  </a:txBody>
+                  <a:tcPr marL="68580" marR="68580" marT="0" marB="0"/>
+                </a:tc>
+                <a:tc>
+                  <a:txBody>
+                    <a:bodyPr/>
+                    <a:lstStyle/>
+                    <a:p>
+                      <a:pPr marL="0" marR="118745" indent="0" algn="ctr" rtl="0">
+                        <a:lnSpc>
+                          <a:spcPct val="150000"/>
+                        </a:lnSpc>
+                        <a:spcBef>
+                          <a:spcPts val="0"/>
+                        </a:spcBef>
+                        <a:spcAft>
+                          <a:spcPts val="0"/>
+                        </a:spcAft>
+                      </a:pPr>
+                      <a:r>
+                        <a:rPr lang="en-US" sz="2000" b="1">
+                          <a:effectLst/>
+                          <a:latin typeface="Gill Sans MT (גוף)"/>
+                          <a:ea typeface="Calibri" panose="020F0502020204030204" pitchFamily="34" charset="0"/>
+                          <a:cs typeface="Arial" panose="020B0604020202020204" pitchFamily="34" charset="0"/>
+                        </a:rPr>
+                        <a:t>CNN </a:t>
+                      </a:r>
+                    </a:p>
+                    <a:p>
+                      <a:pPr marL="0" marR="118745" indent="0" algn="ctr" rtl="0">
+                        <a:lnSpc>
+                          <a:spcPct val="150000"/>
+                        </a:lnSpc>
+                        <a:spcBef>
+                          <a:spcPts val="0"/>
+                        </a:spcBef>
+                        <a:spcAft>
+                          <a:spcPts val="0"/>
+                        </a:spcAft>
+                      </a:pPr>
+                      <a:r>
+                        <a:rPr lang="en-US" sz="2000" b="1">
+                          <a:effectLst/>
+                          <a:latin typeface="Gill Sans MT (גוף)"/>
+                          <a:ea typeface="Calibri" panose="020F0502020204030204" pitchFamily="34" charset="0"/>
+                          <a:cs typeface="Arial" panose="020B0604020202020204" pitchFamily="34" charset="0"/>
+                        </a:rPr>
+                        <a:t>&amp;</a:t>
+                      </a:r>
+                    </a:p>
+                    <a:p>
+                      <a:pPr marL="0" marR="118745" indent="0" algn="ctr" rtl="0">
+                        <a:lnSpc>
+                          <a:spcPct val="150000"/>
+                        </a:lnSpc>
+                        <a:spcBef>
+                          <a:spcPts val="0"/>
+                        </a:spcBef>
+                        <a:spcAft>
+                          <a:spcPts val="0"/>
+                        </a:spcAft>
+                      </a:pPr>
+                      <a:r>
+                        <a:rPr lang="en-US" sz="2000" b="1">
+                          <a:effectLst/>
+                          <a:latin typeface="Gill Sans MT (גוף)"/>
+                          <a:ea typeface="Calibri" panose="020F0502020204030204" pitchFamily="34" charset="0"/>
+                          <a:cs typeface="Arial" panose="020B0604020202020204" pitchFamily="34" charset="0"/>
+                        </a:rPr>
+                        <a:t>KERAS TUNER</a:t>
+                      </a:r>
+                    </a:p>
+                  </a:txBody>
+                  <a:tcPr marL="68580" marR="68580" marT="0" marB="0"/>
+                </a:tc>
+                <a:extLst>
+                  <a:ext uri="{0D108BD9-81ED-4DB2-BD59-A6C34878D82A}">
+                    <a16:rowId xmlns:a16="http://schemas.microsoft.com/office/drawing/2014/main" val="2640574179"/>
+                  </a:ext>
+                </a:extLst>
+              </a:tr>
+              <a:tr h="841321">
+                <a:tc>
+                  <a:txBody>
+                    <a:bodyPr/>
+                    <a:lstStyle/>
+                    <a:p>
+                      <a:pPr marL="0" marR="114300" indent="0" algn="ctr" rtl="0">
+                        <a:lnSpc>
+                          <a:spcPct val="150000"/>
+                        </a:lnSpc>
+                        <a:spcBef>
+                          <a:spcPts val="0"/>
+                        </a:spcBef>
+                        <a:spcAft>
+                          <a:spcPts val="0"/>
+                        </a:spcAft>
+                      </a:pPr>
+                      <a:r>
+                        <a:rPr lang="en-US" sz="2400" b="1">
+                          <a:effectLst/>
+                        </a:rPr>
+                        <a:t>Train accuracy</a:t>
+                      </a:r>
+                      <a:endParaRPr lang="en-US" sz="2000" b="1">
+                        <a:effectLst/>
+                        <a:latin typeface="Calibri" panose="020F0502020204030204" pitchFamily="34" charset="0"/>
+                        <a:ea typeface="Calibri" panose="020F0502020204030204" pitchFamily="34" charset="0"/>
+                        <a:cs typeface="Arial" panose="020B0604020202020204" pitchFamily="34" charset="0"/>
+                      </a:endParaRPr>
+                    </a:p>
+                  </a:txBody>
+                  <a:tcPr marL="68580" marR="68580" marT="0" marB="0"/>
+                </a:tc>
+                <a:tc>
+                  <a:txBody>
+                    <a:bodyPr/>
+                    <a:lstStyle/>
+                    <a:p>
+                      <a:pPr marL="0" marR="114300" indent="0" algn="ctr" rtl="0">
+                        <a:lnSpc>
+                          <a:spcPct val="150000"/>
+                        </a:lnSpc>
+                        <a:spcBef>
+                          <a:spcPts val="0"/>
+                        </a:spcBef>
+                        <a:spcAft>
+                          <a:spcPts val="0"/>
+                        </a:spcAft>
+                      </a:pPr>
+                      <a:r>
+                        <a:rPr lang="en-US" sz="2400" b="1">
+                          <a:effectLst/>
+                        </a:rPr>
+                        <a:t>0.5544</a:t>
+                      </a:r>
+                      <a:endParaRPr lang="en-US" sz="2000" b="1">
+                        <a:effectLst/>
+                        <a:latin typeface="Calibri" panose="020F0502020204030204" pitchFamily="34" charset="0"/>
+                        <a:ea typeface="Calibri" panose="020F0502020204030204" pitchFamily="34" charset="0"/>
+                        <a:cs typeface="Arial" panose="020B0604020202020204" pitchFamily="34" charset="0"/>
+                      </a:endParaRPr>
+                    </a:p>
+                  </a:txBody>
+                  <a:tcPr marL="68580" marR="68580" marT="0" marB="0"/>
+                </a:tc>
+                <a:tc>
+                  <a:txBody>
+                    <a:bodyPr/>
+                    <a:lstStyle/>
+                    <a:p>
+                      <a:pPr marL="0" marR="114300" indent="0" algn="ctr" rtl="0">
+                        <a:lnSpc>
+                          <a:spcPct val="150000"/>
+                        </a:lnSpc>
+                        <a:spcBef>
+                          <a:spcPts val="0"/>
+                        </a:spcBef>
+                        <a:spcAft>
+                          <a:spcPts val="0"/>
+                        </a:spcAft>
+                      </a:pPr>
+                      <a:r>
+                        <a:rPr lang="en-US" sz="2400" b="1">
+                          <a:effectLst/>
+                        </a:rPr>
+                        <a:t>0.771</a:t>
+                      </a:r>
+                      <a:endParaRPr lang="en-US" sz="2000" b="1">
+                        <a:effectLst/>
+                        <a:latin typeface="Calibri" panose="020F0502020204030204" pitchFamily="34" charset="0"/>
+                        <a:ea typeface="Calibri" panose="020F0502020204030204" pitchFamily="34" charset="0"/>
+                        <a:cs typeface="Arial" panose="020B0604020202020204" pitchFamily="34" charset="0"/>
+                      </a:endParaRPr>
+                    </a:p>
+                  </a:txBody>
+                  <a:tcPr marL="68580" marR="68580" marT="0" marB="0"/>
+                </a:tc>
+                <a:tc>
+                  <a:txBody>
+                    <a:bodyPr/>
+                    <a:lstStyle/>
+                    <a:p>
+                      <a:pPr marL="0" marR="114300" indent="0" algn="ctr" rtl="0">
+                        <a:lnSpc>
+                          <a:spcPct val="150000"/>
+                        </a:lnSpc>
+                        <a:spcBef>
+                          <a:spcPts val="0"/>
+                        </a:spcBef>
+                        <a:spcAft>
+                          <a:spcPts val="0"/>
+                        </a:spcAft>
+                      </a:pPr>
+                      <a:r>
+                        <a:rPr lang="en-US" sz="2400" b="1">
+                          <a:effectLst/>
+                        </a:rPr>
+                        <a:t>1</a:t>
+                      </a:r>
+                      <a:endParaRPr lang="en-US" sz="2000" b="1">
+                        <a:effectLst/>
+                        <a:latin typeface="Calibri" panose="020F0502020204030204" pitchFamily="34" charset="0"/>
+                        <a:ea typeface="Calibri" panose="020F0502020204030204" pitchFamily="34" charset="0"/>
+                        <a:cs typeface="Arial" panose="020B0604020202020204" pitchFamily="34" charset="0"/>
+                      </a:endParaRPr>
+                    </a:p>
+                  </a:txBody>
+                  <a:tcPr marL="68580" marR="68580" marT="0" marB="0"/>
+                </a:tc>
+                <a:tc>
+                  <a:txBody>
+                    <a:bodyPr/>
+                    <a:lstStyle/>
+                    <a:p>
+                      <a:pPr marL="0" marR="114300" indent="0" algn="ctr" rtl="0">
+                        <a:lnSpc>
+                          <a:spcPct val="150000"/>
+                        </a:lnSpc>
+                        <a:spcBef>
+                          <a:spcPts val="0"/>
+                        </a:spcBef>
+                        <a:spcAft>
+                          <a:spcPts val="0"/>
+                        </a:spcAft>
+                      </a:pPr>
+                      <a:r>
+                        <a:rPr lang="en-US" sz="2400" b="1">
+                          <a:effectLst/>
+                          <a:latin typeface="Gill Sans MT (גוף)"/>
+                          <a:ea typeface="Calibri" panose="020F0502020204030204" pitchFamily="34" charset="0"/>
+                          <a:cs typeface="Arial" panose="020B0604020202020204" pitchFamily="34" charset="0"/>
+                        </a:rPr>
+                        <a:t>1</a:t>
+                      </a:r>
+                    </a:p>
+                  </a:txBody>
+                  <a:tcPr marL="68580" marR="68580" marT="0" marB="0"/>
+                </a:tc>
+                <a:extLst>
+                  <a:ext uri="{0D108BD9-81ED-4DB2-BD59-A6C34878D82A}">
+                    <a16:rowId xmlns:a16="http://schemas.microsoft.com/office/drawing/2014/main" val="1696315315"/>
+                  </a:ext>
+                </a:extLst>
+              </a:tr>
+              <a:tr h="841321">
+                <a:tc>
+                  <a:txBody>
+                    <a:bodyPr/>
+                    <a:lstStyle/>
+                    <a:p>
+                      <a:pPr marL="0" marR="114300" indent="0" algn="ctr" rtl="0">
+                        <a:lnSpc>
+                          <a:spcPct val="150000"/>
+                        </a:lnSpc>
+                        <a:spcBef>
+                          <a:spcPts val="0"/>
+                        </a:spcBef>
+                        <a:spcAft>
+                          <a:spcPts val="0"/>
+                        </a:spcAft>
+                      </a:pPr>
+                      <a:r>
+                        <a:rPr lang="en-US" sz="2400" b="1">
+                          <a:effectLst/>
+                        </a:rPr>
+                        <a:t>Test accuracy</a:t>
+                      </a:r>
+                      <a:endParaRPr lang="en-US" sz="2000" b="1">
+                        <a:effectLst/>
+                        <a:latin typeface="Calibri" panose="020F0502020204030204" pitchFamily="34" charset="0"/>
+                        <a:ea typeface="Calibri" panose="020F0502020204030204" pitchFamily="34" charset="0"/>
+                        <a:cs typeface="Arial" panose="020B0604020202020204" pitchFamily="34" charset="0"/>
+                      </a:endParaRPr>
+                    </a:p>
+                  </a:txBody>
+                  <a:tcPr marL="68580" marR="68580" marT="0" marB="0"/>
+                </a:tc>
+                <a:tc>
+                  <a:txBody>
+                    <a:bodyPr/>
+                    <a:lstStyle/>
+                    <a:p>
+                      <a:pPr marL="0" marR="114300" indent="0" algn="ctr" rtl="0">
+                        <a:lnSpc>
+                          <a:spcPct val="150000"/>
+                        </a:lnSpc>
+                        <a:spcBef>
+                          <a:spcPts val="0"/>
+                        </a:spcBef>
+                        <a:spcAft>
+                          <a:spcPts val="0"/>
+                        </a:spcAft>
+                      </a:pPr>
+                      <a:r>
+                        <a:rPr lang="en-US" sz="2400" b="1">
+                          <a:effectLst/>
+                        </a:rPr>
+                        <a:t>0.3683</a:t>
+                      </a:r>
+                      <a:endParaRPr lang="en-US" sz="2000" b="1">
+                        <a:effectLst/>
+                        <a:latin typeface="Calibri" panose="020F0502020204030204" pitchFamily="34" charset="0"/>
+                        <a:ea typeface="Calibri" panose="020F0502020204030204" pitchFamily="34" charset="0"/>
+                        <a:cs typeface="Arial" panose="020B0604020202020204" pitchFamily="34" charset="0"/>
+                      </a:endParaRPr>
+                    </a:p>
+                  </a:txBody>
+                  <a:tcPr marL="68580" marR="68580" marT="0" marB="0"/>
+                </a:tc>
+                <a:tc>
+                  <a:txBody>
+                    <a:bodyPr/>
+                    <a:lstStyle/>
+                    <a:p>
+                      <a:pPr marL="0" marR="114300" indent="0" algn="ctr" rtl="0">
+                        <a:lnSpc>
+                          <a:spcPct val="150000"/>
+                        </a:lnSpc>
+                        <a:spcBef>
+                          <a:spcPts val="0"/>
+                        </a:spcBef>
+                        <a:spcAft>
+                          <a:spcPts val="0"/>
+                        </a:spcAft>
+                      </a:pPr>
+                      <a:r>
+                        <a:rPr lang="en-US" sz="2400" b="1">
+                          <a:effectLst/>
+                        </a:rPr>
+                        <a:t>0.5753</a:t>
+                      </a:r>
+                      <a:endParaRPr lang="en-US" sz="2000" b="1">
+                        <a:effectLst/>
+                        <a:latin typeface="Calibri" panose="020F0502020204030204" pitchFamily="34" charset="0"/>
+                        <a:ea typeface="Calibri" panose="020F0502020204030204" pitchFamily="34" charset="0"/>
+                        <a:cs typeface="Arial" panose="020B0604020202020204" pitchFamily="34" charset="0"/>
+                      </a:endParaRPr>
+                    </a:p>
+                  </a:txBody>
+                  <a:tcPr marL="68580" marR="68580" marT="0" marB="0"/>
+                </a:tc>
+                <a:tc>
+                  <a:txBody>
+                    <a:bodyPr/>
+                    <a:lstStyle/>
+                    <a:p>
+                      <a:pPr marL="0" marR="114300" indent="0" algn="ctr" rtl="0">
+                        <a:lnSpc>
+                          <a:spcPct val="150000"/>
+                        </a:lnSpc>
+                        <a:spcBef>
+                          <a:spcPts val="0"/>
+                        </a:spcBef>
+                        <a:spcAft>
+                          <a:spcPts val="0"/>
+                        </a:spcAft>
+                      </a:pPr>
+                      <a:r>
+                        <a:rPr lang="en-US" sz="2400" b="1">
+                          <a:effectLst/>
+                        </a:rPr>
+                        <a:t>0.672</a:t>
+                      </a:r>
+                      <a:endParaRPr lang="en-US" sz="2000" b="1">
+                        <a:effectLst/>
+                        <a:latin typeface="Calibri" panose="020F0502020204030204" pitchFamily="34" charset="0"/>
+                        <a:ea typeface="Calibri" panose="020F0502020204030204" pitchFamily="34" charset="0"/>
+                        <a:cs typeface="Arial" panose="020B0604020202020204" pitchFamily="34" charset="0"/>
+                      </a:endParaRPr>
+                    </a:p>
+                  </a:txBody>
+                  <a:tcPr marL="68580" marR="68580" marT="0" marB="0"/>
+                </a:tc>
+                <a:tc>
+                  <a:txBody>
+                    <a:bodyPr/>
+                    <a:lstStyle/>
+                    <a:p>
+                      <a:pPr marL="0" marR="114300" indent="0" algn="ctr" rtl="0">
+                        <a:lnSpc>
+                          <a:spcPct val="150000"/>
+                        </a:lnSpc>
+                        <a:spcBef>
+                          <a:spcPts val="0"/>
+                        </a:spcBef>
+                        <a:spcAft>
+                          <a:spcPts val="0"/>
+                        </a:spcAft>
+                      </a:pPr>
+                      <a:r>
+                        <a:rPr lang="en-US" sz="2000" b="1">
+                          <a:effectLst/>
+                          <a:latin typeface="Gill Sans MT (גוף)"/>
+                          <a:ea typeface="Calibri" panose="020F0502020204030204" pitchFamily="34" charset="0"/>
+                          <a:cs typeface="Arial" panose="020B0604020202020204" pitchFamily="34" charset="0"/>
+                        </a:rPr>
+                        <a:t>0.804</a:t>
+                      </a:r>
+                    </a:p>
+                  </a:txBody>
+                  <a:tcPr marL="68580" marR="68580" marT="0" marB="0"/>
+                </a:tc>
+                <a:extLst>
+                  <a:ext uri="{0D108BD9-81ED-4DB2-BD59-A6C34878D82A}">
+                    <a16:rowId xmlns:a16="http://schemas.microsoft.com/office/drawing/2014/main" val="2865792078"/>
+                  </a:ext>
+                </a:extLst>
+              </a:tr>
+            </a:tbl>
+          </a:graphicData>
+        </a:graphic>
+      </p:graphicFrame>
     </p:spTree>
     <p:extLst>
       <p:ext uri="{BB962C8B-B14F-4D97-AF65-F5344CB8AC3E}">
-        <p14:creationId xmlns:p14="http://schemas.microsoft.com/office/powerpoint/2010/main" val="2426046296"/>
+        <p14:creationId xmlns:p14="http://schemas.microsoft.com/office/powerpoint/2010/main" val="2267438700"/>
       </p:ext>
     </p:extLst>
   </p:cSld>
@@ -8260,6 +8979,140 @@
     <p:extLst>
       <p:ext uri="{BB962C8B-B14F-4D97-AF65-F5344CB8AC3E}">
         <p14:creationId xmlns:p14="http://schemas.microsoft.com/office/powerpoint/2010/main" val="1905381131"/>
+      </p:ext>
+    </p:extLst>
+  </p:cSld>
+  <p:clrMapOvr>
+    <a:masterClrMapping/>
+  </p:clrMapOvr>
+</p:sld>
+</file>
+
+<file path=ppt/slides/slide20.xml><?xml version="1.0" encoding="utf-8"?>
+<p:sld xmlns:a="http://schemas.openxmlformats.org/drawingml/2006/main" xmlns:r="http://schemas.openxmlformats.org/officeDocument/2006/relationships" xmlns:p="http://schemas.openxmlformats.org/presentationml/2006/main">
+  <p:cSld>
+    <p:spTree>
+      <p:nvGrpSpPr>
+        <p:cNvPr id="1" name=""/>
+        <p:cNvGrpSpPr/>
+        <p:nvPr/>
+      </p:nvGrpSpPr>
+      <p:grpSpPr>
+        <a:xfrm>
+          <a:off x="0" y="0"/>
+          <a:ext cx="0" cy="0"/>
+          <a:chOff x="0" y="0"/>
+          <a:chExt cx="0" cy="0"/>
+        </a:xfrm>
+      </p:grpSpPr>
+      <p:sp>
+        <p:nvSpPr>
+          <p:cNvPr id="2" name="כותרת 1">
+            <a:extLst>
+              <a:ext uri="{FF2B5EF4-FFF2-40B4-BE49-F238E27FC236}">
+                <a16:creationId xmlns:a16="http://schemas.microsoft.com/office/drawing/2014/main" id="{536398F8-96B7-4D67-B796-B1B230F415F4}"/>
+              </a:ext>
+            </a:extLst>
+          </p:cNvPr>
+          <p:cNvSpPr>
+            <a:spLocks noGrp="1"/>
+          </p:cNvSpPr>
+          <p:nvPr>
+            <p:ph type="title"/>
+          </p:nvPr>
+        </p:nvSpPr>
+        <p:spPr/>
+        <p:txBody>
+          <a:bodyPr/>
+          <a:lstStyle/>
+          <a:p>
+            <a:r>
+              <a:rPr lang="en-US"/>
+              <a:t>CONCLUSIONS</a:t>
+            </a:r>
+          </a:p>
+        </p:txBody>
+      </p:sp>
+      <p:sp>
+        <p:nvSpPr>
+          <p:cNvPr id="3" name="מציין מיקום תוכן 2">
+            <a:extLst>
+              <a:ext uri="{FF2B5EF4-FFF2-40B4-BE49-F238E27FC236}">
+                <a16:creationId xmlns:a16="http://schemas.microsoft.com/office/drawing/2014/main" id="{EE30DDD9-FD29-49AE-8A76-B70A1E59C009}"/>
+              </a:ext>
+            </a:extLst>
+          </p:cNvPr>
+          <p:cNvSpPr>
+            <a:spLocks noGrp="1"/>
+          </p:cNvSpPr>
+          <p:nvPr>
+            <p:ph idx="1"/>
+          </p:nvPr>
+        </p:nvSpPr>
+        <p:spPr>
+          <a:xfrm>
+            <a:off x="581192" y="2180496"/>
+            <a:ext cx="11029615" cy="4232027"/>
+          </a:xfrm>
+        </p:spPr>
+        <p:txBody>
+          <a:bodyPr>
+            <a:normAutofit fontScale="92500" lnSpcReduction="10000"/>
+          </a:bodyPr>
+          <a:lstStyle/>
+          <a:p>
+            <a:pPr marL="0" indent="0">
+              <a:lnSpc>
+                <a:spcPct val="150000"/>
+              </a:lnSpc>
+              <a:buNone/>
+            </a:pPr>
+            <a:r>
+              <a:rPr lang="en-US" sz="2800">
+                <a:solidFill>
+                  <a:srgbClr val="000000"/>
+                </a:solidFill>
+                <a:effectLst/>
+                <a:latin typeface="David" panose="020E0502060401010101" pitchFamily="34" charset="-79"/>
+                <a:ea typeface="Times New Roman" panose="02020603050405020304" pitchFamily="18" charset="0"/>
+                <a:cs typeface="Arial" panose="020B0604020202020204" pitchFamily="34" charset="0"/>
+              </a:rPr>
+              <a:t>In conclusion, convoluted neural networks appear to be efficient and smart in comparison to other machine-learning algorithms. The main advantage of CNN compared to its predecessors is that it automatically detects the important features without any human supervision. Little dependence on preprocessing, decreasing the needs of human effort developing its functionalities. From this experience, we gathered that CNN might overfit quickly and thus require additional effort in generalizing.</a:t>
+            </a:r>
+            <a:r>
+              <a:rPr lang="en-US" sz="2800">
+                <a:solidFill>
+                  <a:srgbClr val="202124"/>
+                </a:solidFill>
+                <a:effectLst/>
+                <a:latin typeface="Arial" panose="020B0604020202020204" pitchFamily="34" charset="0"/>
+                <a:ea typeface="Calibri" panose="020F0502020204030204" pitchFamily="34" charset="0"/>
+                <a:cs typeface="Arial" panose="020B0604020202020204" pitchFamily="34" charset="0"/>
+              </a:rPr>
+              <a:t> </a:t>
+            </a:r>
+            <a:endParaRPr lang="en-US" sz="2800">
+              <a:effectLst/>
+              <a:latin typeface="Calibri" panose="020F0502020204030204" pitchFamily="34" charset="0"/>
+              <a:ea typeface="Calibri" panose="020F0502020204030204" pitchFamily="34" charset="0"/>
+              <a:cs typeface="Arial" panose="020B0604020202020204" pitchFamily="34" charset="0"/>
+            </a:endParaRPr>
+          </a:p>
+          <a:p>
+            <a:pPr marL="0" indent="0">
+              <a:lnSpc>
+                <a:spcPct val="150000"/>
+              </a:lnSpc>
+              <a:buNone/>
+            </a:pPr>
+            <a:endParaRPr lang="en-US" sz="2800"/>
+          </a:p>
+        </p:txBody>
+      </p:sp>
+    </p:spTree>
+    <p:extLst>
+      <p:ext uri="{BB962C8B-B14F-4D97-AF65-F5344CB8AC3E}">
+        <p14:creationId xmlns:p14="http://schemas.microsoft.com/office/powerpoint/2010/main" val="2426046296"/>
       </p:ext>
     </p:extLst>
   </p:cSld>

</xml_diff>